<commit_message>
Adding youtube link to poster
</commit_message>
<xml_diff>
--- a/howard/poster/moon_poster.pptx
+++ b/howard/poster/moon_poster.pptx
@@ -238,7 +238,7 @@
           <a:p>
             <a:fld id="{C290F865-70EC-4A0E-9ADE-6B90F4CED08B}" type="datetimeFigureOut">
               <a:rPr lang="en-US" smtClean="0"/>
-              <a:t>3/16/2020</a:t>
+              <a:t>3/17/2020</a:t>
             </a:fld>
             <a:endParaRPr lang="en-US"/>
           </a:p>
@@ -784,7 +784,7 @@
               <a:pPr>
                 <a:defRPr/>
               </a:pPr>
-              <a:t>3/16/2020</a:t>
+              <a:t>3/17/2020</a:t>
             </a:fld>
             <a:endParaRPr lang="en-US"/>
           </a:p>
@@ -997,7 +997,7 @@
               <a:pPr>
                 <a:defRPr/>
               </a:pPr>
-              <a:t>3/16/2020</a:t>
+              <a:t>3/17/2020</a:t>
             </a:fld>
             <a:endParaRPr lang="en-US"/>
           </a:p>
@@ -1220,7 +1220,7 @@
               <a:pPr>
                 <a:defRPr/>
               </a:pPr>
-              <a:t>3/16/2020</a:t>
+              <a:t>3/17/2020</a:t>
             </a:fld>
             <a:endParaRPr lang="en-US"/>
           </a:p>
@@ -1433,7 +1433,7 @@
               <a:pPr>
                 <a:defRPr/>
               </a:pPr>
-              <a:t>3/16/2020</a:t>
+              <a:t>3/17/2020</a:t>
             </a:fld>
             <a:endParaRPr lang="en-US"/>
           </a:p>
@@ -1723,7 +1723,7 @@
               <a:pPr>
                 <a:defRPr/>
               </a:pPr>
-              <a:t>3/16/2020</a:t>
+              <a:t>3/17/2020</a:t>
             </a:fld>
             <a:endParaRPr lang="en-US"/>
           </a:p>
@@ -2053,7 +2053,7 @@
               <a:pPr>
                 <a:defRPr/>
               </a:pPr>
-              <a:t>3/16/2020</a:t>
+              <a:t>3/17/2020</a:t>
             </a:fld>
             <a:endParaRPr lang="en-US"/>
           </a:p>
@@ -2522,7 +2522,7 @@
               <a:pPr>
                 <a:defRPr/>
               </a:pPr>
-              <a:t>3/16/2020</a:t>
+              <a:t>3/17/2020</a:t>
             </a:fld>
             <a:endParaRPr lang="en-US"/>
           </a:p>
@@ -2684,7 +2684,7 @@
               <a:pPr>
                 <a:defRPr/>
               </a:pPr>
-              <a:t>3/16/2020</a:t>
+              <a:t>3/17/2020</a:t>
             </a:fld>
             <a:endParaRPr lang="en-US"/>
           </a:p>
@@ -2824,7 +2824,7 @@
               <a:pPr>
                 <a:defRPr/>
               </a:pPr>
-              <a:t>3/16/2020</a:t>
+              <a:t>3/17/2020</a:t>
             </a:fld>
             <a:endParaRPr lang="en-US"/>
           </a:p>
@@ -3144,7 +3144,7 @@
               <a:pPr>
                 <a:defRPr/>
               </a:pPr>
-              <a:t>3/16/2020</a:t>
+              <a:t>3/17/2020</a:t>
             </a:fld>
             <a:endParaRPr lang="en-US"/>
           </a:p>
@@ -3444,7 +3444,7 @@
               <a:pPr>
                 <a:defRPr/>
               </a:pPr>
-              <a:t>3/16/2020</a:t>
+              <a:t>3/17/2020</a:t>
             </a:fld>
             <a:endParaRPr lang="en-US"/>
           </a:p>
@@ -3770,7 +3770,7 @@
               <a:pPr>
                 <a:defRPr/>
               </a:pPr>
-              <a:t>3/16/2020</a:t>
+              <a:t>3/17/2020</a:t>
             </a:fld>
             <a:endParaRPr lang="en-US"/>
           </a:p>
@@ -4608,13 +4608,13 @@
                 </a:solidFill>
                 <a:latin typeface="Arial" panose="020B0604020202020204" pitchFamily="34" charset="0"/>
               </a:rPr>
-              <a:t>YouTube Link Here</a:t>
+              <a:t>https://youtu.be/8cISaVsOqs0</a:t>
             </a:r>
           </a:p>
         </p:txBody>
       </p:sp>
-      <mc:AlternateContent xmlns:mc="http://schemas.openxmlformats.org/markup-compatibility/2006">
-        <mc:Choice xmlns:a14="http://schemas.microsoft.com/office/drawing/2010/main" Requires="a14">
+      <mc:AlternateContent xmlns:mc="http://schemas.openxmlformats.org/markup-compatibility/2006" xmlns:a14="http://schemas.microsoft.com/office/drawing/2010/main">
+        <mc:Choice Requires="a14">
           <p:sp>
             <p:nvSpPr>
               <p:cNvPr id="17" name="TextBox 16">
@@ -4706,7 +4706,7 @@
             </p:txBody>
           </p:sp>
         </mc:Choice>
-        <mc:Fallback>
+        <mc:Fallback xmlns="">
           <p:sp>
             <p:nvSpPr>
               <p:cNvPr id="17" name="TextBox 16">
@@ -5060,8 +5060,8 @@
           </a:p>
         </p:txBody>
       </p:sp>
-      <mc:AlternateContent xmlns:mc="http://schemas.openxmlformats.org/markup-compatibility/2006">
-        <mc:Choice xmlns:a14="http://schemas.microsoft.com/office/drawing/2010/main" Requires="a14">
+      <mc:AlternateContent xmlns:mc="http://schemas.openxmlformats.org/markup-compatibility/2006" xmlns:a14="http://schemas.microsoft.com/office/drawing/2010/main">
+        <mc:Choice Requires="a14">
           <p:sp>
             <p:nvSpPr>
               <p:cNvPr id="38" name="TextBox 37">
@@ -5163,6 +5163,7 @@
                 </a:r>
               </a:p>
               <a:p>
+                <a:pPr/>
                 <a14:m>
                   <m:oMathPara xmlns:m="http://schemas.openxmlformats.org/officeDocument/2006/math">
                     <m:oMathParaPr>
@@ -5709,6 +5710,7 @@
                 </a:r>
               </a:p>
               <a:p>
+                <a:pPr/>
                 <a14:m>
                   <m:oMathPara xmlns:m="http://schemas.openxmlformats.org/officeDocument/2006/math">
                     <m:oMathParaPr>
@@ -6013,7 +6015,7 @@
             </p:txBody>
           </p:sp>
         </mc:Choice>
-        <mc:Fallback>
+        <mc:Fallback xmlns="">
           <p:sp>
             <p:nvSpPr>
               <p:cNvPr id="38" name="TextBox 37">
@@ -6317,8 +6319,8 @@
           </a:p>
         </p:txBody>
       </p:sp>
-      <mc:AlternateContent xmlns:mc="http://schemas.openxmlformats.org/markup-compatibility/2006">
-        <mc:Choice xmlns:a14="http://schemas.microsoft.com/office/drawing/2010/main" Requires="a14">
+      <mc:AlternateContent xmlns:mc="http://schemas.openxmlformats.org/markup-compatibility/2006" xmlns:a14="http://schemas.microsoft.com/office/drawing/2010/main">
+        <mc:Choice Requires="a14">
           <p:sp>
             <p:nvSpPr>
               <p:cNvPr id="46" name="TextBox 45">
@@ -6352,6 +6354,7 @@
               </a:bodyPr>
               <a:lstStyle/>
               <a:p>
+                <a:pPr/>
                 <a14:m>
                   <m:oMathPara xmlns:m="http://schemas.openxmlformats.org/officeDocument/2006/math">
                     <m:oMathParaPr>
@@ -6543,6 +6546,7 @@
                 </a:endParaRPr>
               </a:p>
               <a:p>
+                <a:pPr/>
                 <a14:m>
                   <m:oMathPara xmlns:m="http://schemas.openxmlformats.org/officeDocument/2006/math">
                     <m:oMathParaPr>
@@ -6669,6 +6673,7 @@
                 </a:endParaRPr>
               </a:p>
               <a:p>
+                <a:pPr/>
                 <a14:m>
                   <m:oMathPara xmlns:m="http://schemas.openxmlformats.org/officeDocument/2006/math">
                     <m:oMathParaPr>
@@ -6985,7 +6990,7 @@
             </p:txBody>
           </p:sp>
         </mc:Choice>
-        <mc:Fallback>
+        <mc:Fallback xmlns="">
           <p:sp>
             <p:nvSpPr>
               <p:cNvPr id="46" name="TextBox 45">
@@ -7294,8 +7299,8 @@
           </p:txBody>
         </p:sp>
       </p:grpSp>
-      <mc:AlternateContent xmlns:mc="http://schemas.openxmlformats.org/markup-compatibility/2006">
-        <mc:Choice xmlns:a14="http://schemas.microsoft.com/office/drawing/2010/main" Requires="a14">
+      <mc:AlternateContent xmlns:mc="http://schemas.openxmlformats.org/markup-compatibility/2006" xmlns:a14="http://schemas.microsoft.com/office/drawing/2010/main">
+        <mc:Choice Requires="a14">
           <p:sp>
             <p:nvSpPr>
               <p:cNvPr id="57" name="TextBox 56">
@@ -7398,7 +7403,7 @@
             </p:txBody>
           </p:sp>
         </mc:Choice>
-        <mc:Fallback>
+        <mc:Fallback xmlns="">
           <p:sp>
             <p:nvSpPr>
               <p:cNvPr id="57" name="TextBox 56">
@@ -7448,8 +7453,8 @@
           </p:sp>
         </mc:Fallback>
       </mc:AlternateContent>
-      <mc:AlternateContent xmlns:mc="http://schemas.openxmlformats.org/markup-compatibility/2006">
-        <mc:Choice xmlns:a14="http://schemas.microsoft.com/office/drawing/2010/main" Requires="a14">
+      <mc:AlternateContent xmlns:mc="http://schemas.openxmlformats.org/markup-compatibility/2006" xmlns:a14="http://schemas.microsoft.com/office/drawing/2010/main">
+        <mc:Choice Requires="a14">
           <p:sp>
             <p:nvSpPr>
               <p:cNvPr id="58" name="TextBox 57">
@@ -7483,6 +7488,7 @@
               </a:bodyPr>
               <a:lstStyle/>
               <a:p>
+                <a:pPr/>
                 <a14:m>
                   <m:oMathPara xmlns:m="http://schemas.openxmlformats.org/officeDocument/2006/math">
                     <m:oMathParaPr>
@@ -7696,7 +7702,7 @@
             </p:txBody>
           </p:sp>
         </mc:Choice>
-        <mc:Fallback>
+        <mc:Fallback xmlns="">
           <p:sp>
             <p:nvSpPr>
               <p:cNvPr id="58" name="TextBox 57">
@@ -7746,8 +7752,8 @@
           </p:sp>
         </mc:Fallback>
       </mc:AlternateContent>
-      <mc:AlternateContent xmlns:mc="http://schemas.openxmlformats.org/markup-compatibility/2006">
-        <mc:Choice xmlns:a14="http://schemas.microsoft.com/office/drawing/2010/main" Requires="a14">
+      <mc:AlternateContent xmlns:mc="http://schemas.openxmlformats.org/markup-compatibility/2006" xmlns:a14="http://schemas.microsoft.com/office/drawing/2010/main">
+        <mc:Choice Requires="a14">
           <p:sp>
             <p:nvSpPr>
               <p:cNvPr id="63" name="TextBox 62">
@@ -8108,7 +8114,7 @@
             </p:txBody>
           </p:sp>
         </mc:Choice>
-        <mc:Fallback>
+        <mc:Fallback xmlns="">
           <p:sp>
             <p:nvSpPr>
               <p:cNvPr id="63" name="TextBox 62">

</xml_diff>

<commit_message>
Proofread edits to deliverables
</commit_message>
<xml_diff>
--- a/howard/poster/moon_poster.pptx
+++ b/howard/poster/moon_poster.pptx
@@ -5055,7 +5055,7 @@
                 </a:solidFill>
                 <a:latin typeface="Arial" panose="020B0604020202020204" pitchFamily="34" charset="0"/>
               </a:rPr>
-              <a:t> website. A total of 13,589 problems were collected and preprocessed into one-hot and multi-hot formats. For multi-hot, vectors where 140-dimensional long where each dimension encodes presence / absence of a hold. We used an 80/20 ratio for train-test split.</a:t>
+              <a:t> website. A total of 13,589 problems were collected and preprocessed into one-hot and multi-hot formats. For multi-hot, vectors are 140-dimensional long where each dimension encodes presence / absence of a hold. We used an 80/20 ratio for train-test split.</a:t>
             </a:r>
           </a:p>
         </p:txBody>
@@ -8202,7 +8202,7 @@
                 </a:solidFill>
                 <a:latin typeface="Arial" panose="020B0604020202020204" pitchFamily="34" charset="0"/>
               </a:rPr>
-              <a:t>Both problems and holds are represented as nodes on the heterogenous graph, sample for a heterogenous document / word graph</a:t>
+              <a:t>Both problems and holds are represented as nodes on the heterogenous graph – (right) sample for a heterogenous document / word graph</a:t>
             </a:r>
             <a:r>
               <a:rPr lang="en-US" sz="3200" dirty="0">

</xml_diff>

<commit_message>
proof edits to poster
</commit_message>
<xml_diff>
--- a/howard/poster/moon_poster.pptx
+++ b/howard/poster/moon_poster.pptx
@@ -4613,8 +4613,8 @@
           </a:p>
         </p:txBody>
       </p:sp>
-      <mc:AlternateContent xmlns:mc="http://schemas.openxmlformats.org/markup-compatibility/2006" xmlns:a14="http://schemas.microsoft.com/office/drawing/2010/main">
-        <mc:Choice Requires="a14">
+      <mc:AlternateContent xmlns:mc="http://schemas.openxmlformats.org/markup-compatibility/2006">
+        <mc:Choice xmlns:a14="http://schemas.microsoft.com/office/drawing/2010/main" Requires="a14">
           <p:sp>
             <p:nvSpPr>
               <p:cNvPr id="17" name="TextBox 16">
@@ -4700,13 +4700,13 @@
                     </a:solidFill>
                     <a:latin typeface="Arial" panose="020B0604020202020204" pitchFamily="34" charset="0"/>
                   </a:rPr>
-                  <a:t> hop neighbors – a characteristic highly desirable in our problem since each climbing route is directly relatable to other climbing routes via shared holds. Our best-performing model achieves</a:t>
+                  <a:t> hop neighbors – a characteristic highly desirable in our problem since each climbing route is directly relatable to other climbing routes via shared holds. Our best-performing model achieves 0.73 AUC.</a:t>
                 </a:r>
               </a:p>
             </p:txBody>
           </p:sp>
         </mc:Choice>
-        <mc:Fallback xmlns="">
+        <mc:Fallback>
           <p:sp>
             <p:nvSpPr>
               <p:cNvPr id="17" name="TextBox 16">

</xml_diff>

<commit_message>
Updated video and poster
</commit_message>
<xml_diff>
--- a/howard/poster/moon_poster.pptx
+++ b/howard/poster/moon_poster.pptx
@@ -4608,13 +4608,13 @@
                 </a:solidFill>
                 <a:latin typeface="Arial" panose="020B0604020202020204" pitchFamily="34" charset="0"/>
               </a:rPr>
-              <a:t>https://youtu.be/8cISaVsOqs0</a:t>
+              <a:t>https://youtu.be/Q-77DMNKo34</a:t>
             </a:r>
           </a:p>
         </p:txBody>
       </p:sp>
-      <mc:AlternateContent xmlns:mc="http://schemas.openxmlformats.org/markup-compatibility/2006">
-        <mc:Choice xmlns:a14="http://schemas.microsoft.com/office/drawing/2010/main" Requires="a14">
+      <mc:AlternateContent xmlns:mc="http://schemas.openxmlformats.org/markup-compatibility/2006" xmlns:a14="http://schemas.microsoft.com/office/drawing/2010/main">
+        <mc:Choice Requires="a14">
           <p:sp>
             <p:nvSpPr>
               <p:cNvPr id="17" name="TextBox 16">
@@ -4706,7 +4706,7 @@
             </p:txBody>
           </p:sp>
         </mc:Choice>
-        <mc:Fallback>
+        <mc:Fallback xmlns="">
           <p:sp>
             <p:nvSpPr>
               <p:cNvPr id="17" name="TextBox 16">

</xml_diff>